<commit_message>
lookup tables + a few tweaks
</commit_message>
<xml_diff>
--- a/FormBuilding/advanced_form_builder.pptx
+++ b/FormBuilding/advanced_form_builder.pptx
@@ -310,7 +310,7 @@
               <a:pPr>
                 <a:defRPr/>
               </a:pPr>
-              <a:t>11/26/15</a:t>
+              <a:t>11/29/15</a:t>
             </a:fld>
             <a:endParaRPr lang="en-US"/>
           </a:p>
@@ -522,7 +522,7 @@
               <a:pPr>
                 <a:defRPr/>
               </a:pPr>
-              <a:t>11/26/15</a:t>
+              <a:t>11/29/15</a:t>
             </a:fld>
             <a:endParaRPr lang="en-US"/>
           </a:p>
@@ -2621,11 +2621,7 @@
           <a:p>
             <a:r>
               <a:rPr lang="en-US" dirty="0" smtClean="0"/>
-              <a:t>What </a:t>
-            </a:r>
-            <a:r>
-              <a:rPr lang="en-US" dirty="0" smtClean="0"/>
-              <a:t>are some questions we can create?</a:t>
+              <a:t>What are some questions we can create?</a:t>
             </a:r>
             <a:endParaRPr lang="en-US" dirty="0"/>
           </a:p>
@@ -2733,27 +2729,17 @@
               <a:rPr lang="en-US" dirty="0" smtClean="0"/>
               <a:t>Text</a:t>
             </a:r>
-            <a:endParaRPr lang="en-US" dirty="0" smtClean="0"/>
           </a:p>
           <a:p>
             <a:r>
               <a:rPr lang="en-US" dirty="0" smtClean="0"/>
               <a:t>Number</a:t>
             </a:r>
-            <a:endParaRPr lang="en-US" dirty="0" smtClean="0"/>
           </a:p>
           <a:p>
             <a:r>
               <a:rPr lang="en-US" dirty="0" smtClean="0"/>
-              <a:t>…</a:t>
-            </a:r>
-            <a:r>
-              <a:rPr lang="en-US" dirty="0" smtClean="0"/>
-              <a:t>the rest of the simple </a:t>
-            </a:r>
-            <a:r>
-              <a:rPr lang="en-US" dirty="0" smtClean="0"/>
-              <a:t>ones</a:t>
+              <a:t>…the rest of the simple ones</a:t>
             </a:r>
           </a:p>
           <a:p>
@@ -2865,8 +2851,53 @@
             <a:pPr algn="ctr"/>
             <a:r>
               <a:rPr lang="en-US" dirty="0" smtClean="0"/>
-              <a:t>Let’s look at HQ</a:t>
-            </a:r>
+              <a:t>Let’s look at </a:t>
+            </a:r>
+            <a:r>
+              <a:rPr lang="en-US" dirty="0" smtClean="0"/>
+              <a:t>HQ</a:t>
+            </a:r>
+            <a:br>
+              <a:rPr lang="en-US" dirty="0" smtClean="0"/>
+            </a:br>
+            <a:r>
+              <a:rPr lang="en-US" dirty="0"/>
+              <a:t/>
+            </a:r>
+            <a:br>
+              <a:rPr lang="en-US" dirty="0"/>
+            </a:br>
+            <a:r>
+              <a:rPr lang="en-US" dirty="0"/>
+              <a:t> </a:t>
+            </a:r>
+            <a:r>
+              <a:rPr lang="en-US" sz="1400" dirty="0"/>
+              <a:t>https://</a:t>
+            </a:r>
+            <a:r>
+              <a:rPr lang="en-US" sz="1400" dirty="0" err="1"/>
+              <a:t>www.commcarehq.org</a:t>
+            </a:r>
+            <a:r>
+              <a:rPr lang="en-US" sz="1400" dirty="0"/>
+              <a:t>/a/</a:t>
+            </a:r>
+            <a:r>
+              <a:rPr lang="en-US" sz="1400" dirty="0" err="1"/>
+              <a:t>exi</a:t>
+            </a:r>
+            <a:r>
+              <a:rPr lang="en-US" sz="1400" dirty="0"/>
+              <a:t>-training/apps/view/841cb462e89c6bd0e4d0038b4a97367c/modules-0/forms-0/source/ </a:t>
+            </a:r>
+            <a:r>
+              <a:rPr lang="en-US" dirty="0" smtClean="0"/>
+              <a:t/>
+            </a:r>
+            <a:br>
+              <a:rPr lang="en-US" dirty="0" smtClean="0"/>
+            </a:br>
             <a:endParaRPr lang="en-US" dirty="0"/>
           </a:p>
         </p:txBody>
@@ -2918,11 +2949,7 @@
           <a:p>
             <a:r>
               <a:rPr lang="en-US" dirty="0" smtClean="0"/>
-              <a:t>Activity: </a:t>
-            </a:r>
-            <a:r>
-              <a:rPr lang="en-US" dirty="0" smtClean="0"/>
-              <a:t>Advanced Form Builder</a:t>
+              <a:t>Activity: Advanced Form Builder</a:t>
             </a:r>
             <a:endParaRPr lang="en-US" dirty="0"/>
           </a:p>
@@ -2945,36 +2972,25 @@
           <a:p>
             <a:r>
               <a:rPr lang="en-US" dirty="0" smtClean="0"/>
-              <a:t>A community health worker needs to </a:t>
-            </a:r>
-            <a:r>
-              <a:rPr lang="en-US" dirty="0" smtClean="0"/>
-              <a:t>record patients</a:t>
-            </a:r>
-            <a:endParaRPr lang="en-US" dirty="0" smtClean="0"/>
+              <a:t>A community health worker needs to record patients</a:t>
+            </a:r>
           </a:p>
           <a:p>
             <a:r>
               <a:rPr lang="en-US" dirty="0" smtClean="0"/>
               <a:t>Farmers need to record the crops that they grow</a:t>
             </a:r>
-            <a:endParaRPr lang="en-US" dirty="0" smtClean="0"/>
           </a:p>
           <a:p>
             <a:r>
               <a:rPr lang="en-US" dirty="0" smtClean="0"/>
               <a:t>Mailmen need to record all the houses they’ve visited</a:t>
             </a:r>
-            <a:endParaRPr lang="en-US" dirty="0" smtClean="0"/>
           </a:p>
           <a:p>
             <a:r>
               <a:rPr lang="en-US" dirty="0" smtClean="0"/>
-              <a:t>Create your own</a:t>
-            </a:r>
-            <a:r>
-              <a:rPr lang="en-US" dirty="0" smtClean="0"/>
-              <a:t>! (Use at least 3 of the bolded question types)</a:t>
+              <a:t>Create your own! (Use at least 3 of the bolded question types)</a:t>
             </a:r>
             <a:endParaRPr lang="en-US" dirty="0"/>
           </a:p>

</xml_diff>